<commit_message>
Update Car rental system (2).pptx
</commit_message>
<xml_diff>
--- a/Car rental system (2).pptx
+++ b/Car rental system (2).pptx
@@ -15222,12 +15222,8 @@
               <a:t> B55 </a:t>
             </a:r>
             <a:r>
-              <a:rPr lang="en-US" sz="2800" dirty="0" err="1"/>
-              <a:t>Shahu</a:t>
-            </a:r>
-            <a:r>
-              <a:rPr lang="en-US" sz="2800" dirty="0"/>
-              <a:t> </a:t>
+              <a:rPr lang="en-US" sz="2800"/>
+              <a:t>Shahu </a:t>
             </a:r>
             <a:r>
               <a:rPr lang="en-US" sz="2800" dirty="0" err="1"/>

</xml_diff>

<commit_message>
fixed Contact us page
</commit_message>
<xml_diff>
--- a/Car rental system (2).pptx
+++ b/Car rental system (2).pptx
@@ -11,21 +11,19 @@
     <p:sldId id="259" r:id="rId5"/>
     <p:sldId id="260" r:id="rId6"/>
     <p:sldId id="261" r:id="rId7"/>
-    <p:sldId id="279" r:id="rId8"/>
-    <p:sldId id="280" r:id="rId9"/>
-    <p:sldId id="262" r:id="rId10"/>
-    <p:sldId id="263" r:id="rId11"/>
-    <p:sldId id="278" r:id="rId12"/>
-    <p:sldId id="265" r:id="rId13"/>
-    <p:sldId id="281" r:id="rId14"/>
-    <p:sldId id="266" r:id="rId15"/>
-    <p:sldId id="268" r:id="rId16"/>
-    <p:sldId id="269" r:id="rId17"/>
-    <p:sldId id="271" r:id="rId18"/>
-    <p:sldId id="273" r:id="rId19"/>
-    <p:sldId id="275" r:id="rId20"/>
-    <p:sldId id="276" r:id="rId21"/>
-    <p:sldId id="264" r:id="rId22"/>
+    <p:sldId id="262" r:id="rId8"/>
+    <p:sldId id="263" r:id="rId9"/>
+    <p:sldId id="265" r:id="rId10"/>
+    <p:sldId id="278" r:id="rId11"/>
+    <p:sldId id="267" r:id="rId12"/>
+    <p:sldId id="266" r:id="rId13"/>
+    <p:sldId id="268" r:id="rId14"/>
+    <p:sldId id="269" r:id="rId15"/>
+    <p:sldId id="271" r:id="rId16"/>
+    <p:sldId id="273" r:id="rId17"/>
+    <p:sldId id="275" r:id="rId18"/>
+    <p:sldId id="276" r:id="rId19"/>
+    <p:sldId id="264" r:id="rId20"/>
   </p:sldIdLst>
   <p:sldSz cx="12192000" cy="6858000"/>
   <p:notesSz cx="6858000" cy="9144000"/>
@@ -5887,7 +5885,7 @@
           <p:cNvPr id="2" name="Title 1">
             <a:extLst>
               <a:ext uri="{FF2B5EF4-FFF2-40B4-BE49-F238E27FC236}">
-                <a16:creationId xmlns:a16="http://schemas.microsoft.com/office/drawing/2014/main" id="{48F588C4-FDDD-4847-B4F9-159F95D3CBC9}"/>
+                <a16:creationId xmlns:a16="http://schemas.microsoft.com/office/drawing/2014/main" id="{95611569-0580-43AD-9CB0-50C94673FB39}"/>
               </a:ext>
             </a:extLst>
           </p:cNvPr>
@@ -5898,66 +5896,57 @@
             <p:ph type="title"/>
           </p:nvPr>
         </p:nvSpPr>
-        <p:spPr/>
+        <p:spPr>
+          <a:xfrm>
+            <a:off x="685801" y="609601"/>
+            <a:ext cx="3337559" cy="1005840"/>
+          </a:xfrm>
+        </p:spPr>
         <p:txBody>
           <a:bodyPr/>
           <a:lstStyle/>
           <a:p>
             <a:r>
-              <a:rPr lang="en-US" dirty="0"/>
-              <a:t>Limitations</a:t>
+              <a:rPr lang="en-IN" dirty="0"/>
+              <a:t>USE CASE</a:t>
             </a:r>
-            <a:endParaRPr lang="en-IN" dirty="0"/>
           </a:p>
         </p:txBody>
       </p:sp>
-      <p:sp>
-        <p:nvSpPr>
-          <p:cNvPr id="3" name="Content Placeholder 2">
+      <p:pic>
+        <p:nvPicPr>
+          <p:cNvPr id="4" name="Picture 3">
             <a:extLst>
               <a:ext uri="{FF2B5EF4-FFF2-40B4-BE49-F238E27FC236}">
-                <a16:creationId xmlns:a16="http://schemas.microsoft.com/office/drawing/2014/main" id="{54C4843A-D34A-4FE0-8167-52E7081C2121}"/>
+                <a16:creationId xmlns:a16="http://schemas.microsoft.com/office/drawing/2014/main" id="{B4A91B21-9E06-411C-91E8-46CB048C749B}"/>
               </a:ext>
             </a:extLst>
           </p:cNvPr>
-          <p:cNvSpPr>
-            <a:spLocks noGrp="1"/>
-          </p:cNvSpPr>
-          <p:nvPr>
-            <p:ph idx="1"/>
-          </p:nvPr>
-        </p:nvSpPr>
-        <p:spPr/>
-        <p:txBody>
-          <a:bodyPr>
-            <a:normAutofit/>
-          </a:bodyPr>
-          <a:lstStyle/>
-          <a:p>
-            <a:r>
-              <a:rPr lang="en-US" sz="2800" dirty="0"/>
-              <a:t>Internet Connectivity</a:t>
-            </a:r>
-          </a:p>
-          <a:p>
-            <a:r>
-              <a:rPr lang="en-US" sz="2800" dirty="0"/>
-              <a:t>Limited Pickup &amp; Drop Points</a:t>
-            </a:r>
-          </a:p>
-          <a:p>
-            <a:r>
-              <a:rPr lang="en-US" sz="2800" dirty="0"/>
-              <a:t>GPS tracking</a:t>
-            </a:r>
-            <a:endParaRPr lang="en-IN" sz="2800" dirty="0"/>
-          </a:p>
-        </p:txBody>
-      </p:sp>
+          <p:cNvPicPr>
+            <a:picLocks noChangeAspect="1"/>
+          </p:cNvPicPr>
+          <p:nvPr/>
+        </p:nvPicPr>
+        <p:blipFill>
+          <a:blip r:embed="rId2"/>
+          <a:stretch>
+            <a:fillRect/>
+          </a:stretch>
+        </p:blipFill>
+        <p:spPr>
+          <a:xfrm>
+            <a:off x="3860800" y="121920"/>
+            <a:ext cx="6807200" cy="6583680"/>
+          </a:xfrm>
+          <a:prstGeom prst="rect">
+            <a:avLst/>
+          </a:prstGeom>
+        </p:spPr>
+      </p:pic>
     </p:spTree>
     <p:extLst>
       <p:ext uri="{BB962C8B-B14F-4D97-AF65-F5344CB8AC3E}">
-        <p14:creationId xmlns:p14="http://schemas.microsoft.com/office/powerpoint/2010/main" val="572627484"/>
+        <p14:creationId xmlns:p14="http://schemas.microsoft.com/office/powerpoint/2010/main" val="3743726555"/>
       </p:ext>
     </p:extLst>
   </p:cSld>
@@ -5989,7 +5978,7 @@
           <p:cNvPr id="2" name="Title 1">
             <a:extLst>
               <a:ext uri="{FF2B5EF4-FFF2-40B4-BE49-F238E27FC236}">
-                <a16:creationId xmlns:a16="http://schemas.microsoft.com/office/drawing/2014/main" id="{95611569-0580-43AD-9CB0-50C94673FB39}"/>
+                <a16:creationId xmlns:a16="http://schemas.microsoft.com/office/drawing/2014/main" id="{C527858F-04A7-4E44-BFE4-E7B25B5FF4EA}"/>
               </a:ext>
             </a:extLst>
           </p:cNvPr>
@@ -6002,244 +5991,43 @@
         </p:nvSpPr>
         <p:spPr>
           <a:xfrm>
-            <a:off x="685801" y="609601"/>
-            <a:ext cx="3337559" cy="1005840"/>
+            <a:off x="0" y="304801"/>
+            <a:ext cx="10131425" cy="583096"/>
           </a:xfrm>
         </p:spPr>
         <p:txBody>
-          <a:bodyPr/>
+          <a:bodyPr>
+            <a:normAutofit fontScale="90000"/>
+          </a:bodyPr>
           <a:lstStyle/>
           <a:p>
+            <a:br>
+              <a:rPr lang="en-US" dirty="0"/>
+            </a:br>
             <a:r>
-              <a:rPr lang="en-IN" dirty="0"/>
-              <a:t>USE CASE</a:t>
+              <a:rPr lang="en-US" sz="4000" b="1" dirty="0"/>
+              <a:t>DATA  DICTIONARY</a:t>
             </a:r>
-          </a:p>
-        </p:txBody>
-      </p:sp>
-      <p:pic>
-        <p:nvPicPr>
-          <p:cNvPr id="5" name="Picture 4">
-            <a:extLst>
-              <a:ext uri="{FF2B5EF4-FFF2-40B4-BE49-F238E27FC236}">
-                <a16:creationId xmlns:a16="http://schemas.microsoft.com/office/drawing/2014/main" id="{C72C0C7F-F253-4946-9095-75160B2B26CA}"/>
-              </a:ext>
-            </a:extLst>
-          </p:cNvPr>
-          <p:cNvPicPr>
-            <a:picLocks noChangeAspect="1"/>
-          </p:cNvPicPr>
-          <p:nvPr/>
-        </p:nvPicPr>
-        <p:blipFill>
-          <a:blip r:embed="rId2"/>
-          <a:stretch>
-            <a:fillRect/>
-          </a:stretch>
-        </p:blipFill>
-        <p:spPr>
-          <a:xfrm>
-            <a:off x="3347063" y="68289"/>
-            <a:ext cx="7788315" cy="6721422"/>
-          </a:xfrm>
-          <a:prstGeom prst="rect">
-            <a:avLst/>
-          </a:prstGeom>
-        </p:spPr>
-      </p:pic>
-    </p:spTree>
-    <p:extLst>
-      <p:ext uri="{BB962C8B-B14F-4D97-AF65-F5344CB8AC3E}">
-        <p14:creationId xmlns:p14="http://schemas.microsoft.com/office/powerpoint/2010/main" val="3743726555"/>
-      </p:ext>
-    </p:extLst>
-  </p:cSld>
-  <p:clrMapOvr>
-    <a:masterClrMapping/>
-  </p:clrMapOvr>
-</p:sld>
-</file>
-
-<file path=ppt/slides/slide12.xml><?xml version="1.0" encoding="utf-8"?>
-<p:sld xmlns:a="http://schemas.openxmlformats.org/drawingml/2006/main" xmlns:r="http://schemas.openxmlformats.org/officeDocument/2006/relationships" xmlns:p="http://schemas.openxmlformats.org/presentationml/2006/main">
-  <p:cSld>
-    <p:spTree>
-      <p:nvGrpSpPr>
-        <p:cNvPr id="1" name=""/>
-        <p:cNvGrpSpPr/>
-        <p:nvPr/>
-      </p:nvGrpSpPr>
-      <p:grpSpPr>
-        <a:xfrm>
-          <a:off x="0" y="0"/>
-          <a:ext cx="0" cy="0"/>
-          <a:chOff x="0" y="0"/>
-          <a:chExt cx="0" cy="0"/>
-        </a:xfrm>
-      </p:grpSpPr>
-      <p:sp>
-        <p:nvSpPr>
-          <p:cNvPr id="4" name="Title 3">
-            <a:extLst>
-              <a:ext uri="{FF2B5EF4-FFF2-40B4-BE49-F238E27FC236}">
-                <a16:creationId xmlns:a16="http://schemas.microsoft.com/office/drawing/2014/main" id="{4B160A0A-020C-4EFF-B2E6-B2A7C4560B99}"/>
-              </a:ext>
-            </a:extLst>
-          </p:cNvPr>
-          <p:cNvSpPr>
-            <a:spLocks noGrp="1"/>
-          </p:cNvSpPr>
-          <p:nvPr>
-            <p:ph type="title"/>
-          </p:nvPr>
-        </p:nvSpPr>
-        <p:spPr>
-          <a:xfrm>
-            <a:off x="0" y="0"/>
-            <a:ext cx="10131425" cy="661137"/>
-          </a:xfrm>
-        </p:spPr>
-        <p:txBody>
-          <a:bodyPr/>
-          <a:lstStyle/>
-          <a:p>
+            <a:br>
+              <a:rPr lang="en-US" dirty="0"/>
+            </a:br>
+            <a:br>
+              <a:rPr lang="en-US" dirty="0"/>
+            </a:br>
             <a:r>
               <a:rPr lang="en-US" dirty="0"/>
-              <a:t>ER DIAGRAM</a:t>
+              <a:t>      Roles</a:t>
             </a:r>
             <a:endParaRPr lang="en-IN" dirty="0"/>
-          </a:p>
-        </p:txBody>
-      </p:sp>
-      <p:pic>
-        <p:nvPicPr>
-          <p:cNvPr id="3" name="Picture 2">
-            <a:extLst>
-              <a:ext uri="{FF2B5EF4-FFF2-40B4-BE49-F238E27FC236}">
-                <a16:creationId xmlns:a16="http://schemas.microsoft.com/office/drawing/2014/main" id="{17D2B219-A778-43F7-AE2B-3C042525A91C}"/>
-              </a:ext>
-            </a:extLst>
-          </p:cNvPr>
-          <p:cNvPicPr>
-            <a:picLocks noChangeAspect="1"/>
-          </p:cNvPicPr>
-          <p:nvPr/>
-        </p:nvPicPr>
-        <p:blipFill>
-          <a:blip r:embed="rId2"/>
-          <a:stretch>
-            <a:fillRect/>
-          </a:stretch>
-        </p:blipFill>
-        <p:spPr>
-          <a:xfrm>
-            <a:off x="650240" y="559293"/>
-            <a:ext cx="10952480" cy="6176788"/>
-          </a:xfrm>
-          <a:prstGeom prst="rect">
-            <a:avLst/>
-          </a:prstGeom>
-        </p:spPr>
-      </p:pic>
-    </p:spTree>
-    <p:extLst>
-      <p:ext uri="{BB962C8B-B14F-4D97-AF65-F5344CB8AC3E}">
-        <p14:creationId xmlns:p14="http://schemas.microsoft.com/office/powerpoint/2010/main" val="2564050425"/>
-      </p:ext>
-    </p:extLst>
-  </p:cSld>
-  <p:clrMapOvr>
-    <a:masterClrMapping/>
-  </p:clrMapOvr>
-</p:sld>
-</file>
-
-<file path=ppt/slides/slide13.xml><?xml version="1.0" encoding="utf-8"?>
-<p:sld xmlns:a="http://schemas.openxmlformats.org/drawingml/2006/main" xmlns:r="http://schemas.openxmlformats.org/officeDocument/2006/relationships" xmlns:p="http://schemas.openxmlformats.org/presentationml/2006/main">
-  <p:cSld>
-    <p:spTree>
-      <p:nvGrpSpPr>
-        <p:cNvPr id="1" name=""/>
-        <p:cNvGrpSpPr/>
-        <p:nvPr/>
-      </p:nvGrpSpPr>
-      <p:grpSpPr>
-        <a:xfrm>
-          <a:off x="0" y="0"/>
-          <a:ext cx="0" cy="0"/>
-          <a:chOff x="0" y="0"/>
-          <a:chExt cx="0" cy="0"/>
-        </a:xfrm>
-      </p:grpSpPr>
-      <p:sp>
-        <p:nvSpPr>
-          <p:cNvPr id="2" name="Title 1">
-            <a:extLst>
-              <a:ext uri="{FF2B5EF4-FFF2-40B4-BE49-F238E27FC236}">
-                <a16:creationId xmlns:a16="http://schemas.microsoft.com/office/drawing/2014/main" id="{7BD4926E-C326-44A3-8A38-E5AD4121D4C7}"/>
-              </a:ext>
-            </a:extLst>
-          </p:cNvPr>
-          <p:cNvSpPr>
-            <a:spLocks noGrp="1"/>
-          </p:cNvSpPr>
-          <p:nvPr>
-            <p:ph type="title"/>
-          </p:nvPr>
-        </p:nvSpPr>
-        <p:spPr/>
-        <p:txBody>
-          <a:bodyPr/>
-          <a:lstStyle/>
-          <a:p>
-            <a:r>
-              <a:rPr lang="en-US" dirty="0"/>
-              <a:t>Data dictionary</a:t>
-            </a:r>
-            <a:endParaRPr lang="en-IN" dirty="0"/>
-          </a:p>
-        </p:txBody>
-      </p:sp>
-      <p:sp>
-        <p:nvSpPr>
-          <p:cNvPr id="3" name="Content Placeholder 2">
-            <a:extLst>
-              <a:ext uri="{FF2B5EF4-FFF2-40B4-BE49-F238E27FC236}">
-                <a16:creationId xmlns:a16="http://schemas.microsoft.com/office/drawing/2014/main" id="{A68F6F73-5126-4DC1-8A99-6A9A3221BCFA}"/>
-              </a:ext>
-            </a:extLst>
-          </p:cNvPr>
-          <p:cNvSpPr>
-            <a:spLocks noGrp="1"/>
-          </p:cNvSpPr>
-          <p:nvPr>
-            <p:ph idx="1"/>
-          </p:nvPr>
-        </p:nvSpPr>
-        <p:spPr/>
-        <p:txBody>
-          <a:bodyPr anchor="t">
-            <a:normAutofit/>
-          </a:bodyPr>
-          <a:lstStyle/>
-          <a:p>
-            <a:r>
-              <a:rPr lang="en-US" sz="2800" dirty="0"/>
-              <a:t>Roles</a:t>
-            </a:r>
-          </a:p>
-          <a:p>
-            <a:pPr lvl="1"/>
-            <a:endParaRPr lang="en-IN" sz="2600" dirty="0"/>
           </a:p>
         </p:txBody>
       </p:sp>
       <p:graphicFrame>
         <p:nvGraphicFramePr>
-          <p:cNvPr id="4" name="Table 3">
+          <p:cNvPr id="3" name="Table 3">
             <a:extLst>
               <a:ext uri="{FF2B5EF4-FFF2-40B4-BE49-F238E27FC236}">
-                <a16:creationId xmlns:a16="http://schemas.microsoft.com/office/drawing/2014/main" id="{4950CC12-EEFA-4DA6-A98C-B11A5AD0F8E8}"/>
+                <a16:creationId xmlns:a16="http://schemas.microsoft.com/office/drawing/2014/main" id="{0BC847FF-D209-496E-AB0E-099BA0F1F5BA}"/>
               </a:ext>
             </a:extLst>
           </p:cNvPr>
@@ -6249,13 +6037,13 @@
           <p:nvPr>
             <p:extLst>
               <p:ext uri="{D42A27DB-BD31-4B8C-83A1-F6EECF244321}">
-                <p14:modId xmlns:p14="http://schemas.microsoft.com/office/powerpoint/2010/main" val="932413612"/>
+                <p14:modId xmlns:p14="http://schemas.microsoft.com/office/powerpoint/2010/main" val="2610836176"/>
               </p:ext>
             </p:extLst>
           </p:nvPr>
         </p:nvGraphicFramePr>
         <p:xfrm>
-          <a:off x="1374774" y="2892568"/>
+          <a:off x="1280160" y="1797067"/>
           <a:ext cx="8128000" cy="2148130"/>
         </p:xfrm>
         <a:graphic>
@@ -6802,7 +6590,7 @@
     </p:spTree>
     <p:extLst>
       <p:ext uri="{BB962C8B-B14F-4D97-AF65-F5344CB8AC3E}">
-        <p14:creationId xmlns:p14="http://schemas.microsoft.com/office/powerpoint/2010/main" val="2284612852"/>
+        <p14:creationId xmlns:p14="http://schemas.microsoft.com/office/powerpoint/2010/main" val="1305580898"/>
       </p:ext>
     </p:extLst>
   </p:cSld>
@@ -6812,7 +6600,7 @@
 </p:sld>
 </file>
 
-<file path=ppt/slides/slide14.xml><?xml version="1.0" encoding="utf-8"?>
+<file path=ppt/slides/slide12.xml><?xml version="1.0" encoding="utf-8"?>
 <p:sld xmlns:a="http://schemas.openxmlformats.org/drawingml/2006/main" xmlns:r="http://schemas.openxmlformats.org/officeDocument/2006/relationships" xmlns:p="http://schemas.openxmlformats.org/presentationml/2006/main">
   <p:cSld>
     <p:spTree>
@@ -6853,23 +6641,15 @@
         </p:spPr>
         <p:txBody>
           <a:bodyPr>
-            <a:noAutofit/>
+            <a:normAutofit fontScale="90000"/>
           </a:bodyPr>
           <a:lstStyle/>
           <a:p>
-            <a:pPr marL="457200" indent="-457200">
-              <a:buFont typeface="Arial" panose="020B0604020202020204" pitchFamily="34" charset="0"/>
-              <a:buChar char="•"/>
-            </a:pPr>
             <a:r>
-              <a:rPr lang="en-US" sz="2800" dirty="0">
-                <a:latin typeface="+mn-lt"/>
-              </a:rPr>
+              <a:rPr lang="en-US" dirty="0"/>
               <a:t>USER</a:t>
             </a:r>
-            <a:endParaRPr lang="en-IN" sz="2800" dirty="0">
-              <a:latin typeface="+mn-lt"/>
-            </a:endParaRPr>
+            <a:endParaRPr lang="en-IN" dirty="0"/>
           </a:p>
         </p:txBody>
       </p:sp>
@@ -7998,7 +7778,7 @@
 </p:sld>
 </file>
 
-<file path=ppt/slides/slide15.xml><?xml version="1.0" encoding="utf-8"?>
+<file path=ppt/slides/slide13.xml><?xml version="1.0" encoding="utf-8"?>
 <p:sld xmlns:a="http://schemas.openxmlformats.org/drawingml/2006/main" xmlns:r="http://schemas.openxmlformats.org/officeDocument/2006/relationships" xmlns:p="http://schemas.openxmlformats.org/presentationml/2006/main">
   <p:cSld>
     <p:spTree>
@@ -9437,7 +9217,7 @@
 </p:sld>
 </file>
 
-<file path=ppt/slides/slide16.xml><?xml version="1.0" encoding="utf-8"?>
+<file path=ppt/slides/slide14.xml><?xml version="1.0" encoding="utf-8"?>
 <p:sld xmlns:a="http://schemas.openxmlformats.org/drawingml/2006/main" xmlns:r="http://schemas.openxmlformats.org/officeDocument/2006/relationships" xmlns:p="http://schemas.openxmlformats.org/presentationml/2006/main">
   <p:cSld>
     <p:spTree>
@@ -9483,8 +9263,8 @@
           <a:lstStyle/>
           <a:p>
             <a:r>
-              <a:rPr lang="en-US" dirty="0" err="1"/>
-              <a:t>carBookingdetails</a:t>
+              <a:rPr lang="en-US"/>
+              <a:t>Car Booking details</a:t>
             </a:r>
             <a:endParaRPr lang="en-IN" dirty="0"/>
           </a:p>
@@ -10684,7 +10464,7 @@
 </p:sld>
 </file>
 
-<file path=ppt/slides/slide17.xml><?xml version="1.0" encoding="utf-8"?>
+<file path=ppt/slides/slide15.xml><?xml version="1.0" encoding="utf-8"?>
 <p:sld xmlns:a="http://schemas.openxmlformats.org/drawingml/2006/main" xmlns:r="http://schemas.openxmlformats.org/officeDocument/2006/relationships" xmlns:p="http://schemas.openxmlformats.org/presentationml/2006/main">
   <p:cSld>
     <p:spTree>
@@ -12182,7 +11962,7 @@
 </p:sld>
 </file>
 
-<file path=ppt/slides/slide18.xml><?xml version="1.0" encoding="utf-8"?>
+<file path=ppt/slides/slide16.xml><?xml version="1.0" encoding="utf-8"?>
 <p:sld xmlns:a="http://schemas.openxmlformats.org/drawingml/2006/main" xmlns:r="http://schemas.openxmlformats.org/officeDocument/2006/relationships" xmlns:p="http://schemas.openxmlformats.org/presentationml/2006/main">
   <p:cSld>
     <p:spTree>
@@ -14108,7 +13888,7 @@
 </p:sld>
 </file>
 
-<file path=ppt/slides/slide19.xml><?xml version="1.0" encoding="utf-8"?>
+<file path=ppt/slides/slide17.xml><?xml version="1.0" encoding="utf-8"?>
 <p:sld xmlns:a="http://schemas.openxmlformats.org/drawingml/2006/main" xmlns:r="http://schemas.openxmlformats.org/officeDocument/2006/relationships" xmlns:p="http://schemas.openxmlformats.org/presentationml/2006/main">
   <p:cSld>
     <p:spTree>
@@ -15114,156 +14894,7 @@
 </p:sld>
 </file>
 
-<file path=ppt/slides/slide2.xml><?xml version="1.0" encoding="utf-8"?>
-<p:sld xmlns:a="http://schemas.openxmlformats.org/drawingml/2006/main" xmlns:r="http://schemas.openxmlformats.org/officeDocument/2006/relationships" xmlns:p="http://schemas.openxmlformats.org/presentationml/2006/main">
-  <p:cSld>
-    <p:spTree>
-      <p:nvGrpSpPr>
-        <p:cNvPr id="1" name=""/>
-        <p:cNvGrpSpPr/>
-        <p:nvPr/>
-      </p:nvGrpSpPr>
-      <p:grpSpPr>
-        <a:xfrm>
-          <a:off x="0" y="0"/>
-          <a:ext cx="0" cy="0"/>
-          <a:chOff x="0" y="0"/>
-          <a:chExt cx="0" cy="0"/>
-        </a:xfrm>
-      </p:grpSpPr>
-      <p:sp>
-        <p:nvSpPr>
-          <p:cNvPr id="2" name="Title 1">
-            <a:extLst>
-              <a:ext uri="{FF2B5EF4-FFF2-40B4-BE49-F238E27FC236}">
-                <a16:creationId xmlns:a16="http://schemas.microsoft.com/office/drawing/2014/main" id="{9E241995-4139-499E-BB99-A4BB82ECFB2E}"/>
-              </a:ext>
-            </a:extLst>
-          </p:cNvPr>
-          <p:cNvSpPr>
-            <a:spLocks noGrp="1"/>
-          </p:cNvSpPr>
-          <p:nvPr>
-            <p:ph type="title"/>
-          </p:nvPr>
-        </p:nvSpPr>
-        <p:spPr/>
-        <p:txBody>
-          <a:bodyPr/>
-          <a:lstStyle/>
-          <a:p>
-            <a:r>
-              <a:rPr lang="en-US" dirty="0"/>
-              <a:t>Group details</a:t>
-            </a:r>
-            <a:endParaRPr lang="en-IN" dirty="0"/>
-          </a:p>
-        </p:txBody>
-      </p:sp>
-      <p:sp>
-        <p:nvSpPr>
-          <p:cNvPr id="3" name="Content Placeholder 2">
-            <a:extLst>
-              <a:ext uri="{FF2B5EF4-FFF2-40B4-BE49-F238E27FC236}">
-                <a16:creationId xmlns:a16="http://schemas.microsoft.com/office/drawing/2014/main" id="{78C9DC47-A332-41A0-966D-9C02FF84D7BA}"/>
-              </a:ext>
-            </a:extLst>
-          </p:cNvPr>
-          <p:cNvSpPr>
-            <a:spLocks noGrp="1"/>
-          </p:cNvSpPr>
-          <p:nvPr>
-            <p:ph idx="1"/>
-          </p:nvPr>
-        </p:nvSpPr>
-        <p:spPr>
-          <a:xfrm>
-            <a:off x="685801" y="2142068"/>
-            <a:ext cx="10131425" cy="3539642"/>
-          </a:xfrm>
-        </p:spPr>
-        <p:txBody>
-          <a:bodyPr>
-            <a:normAutofit/>
-          </a:bodyPr>
-          <a:lstStyle/>
-          <a:p>
-            <a:r>
-              <a:rPr lang="en-US" sz="2800" dirty="0"/>
-              <a:t>Group No : 13</a:t>
-            </a:r>
-          </a:p>
-          <a:p>
-            <a:r>
-              <a:rPr lang="en-US" sz="2800" dirty="0"/>
-              <a:t>Members : B32 Mansuri Mohammed Sufyan</a:t>
-            </a:r>
-          </a:p>
-          <a:p>
-            <a:pPr marL="1828800" lvl="4" indent="0">
-              <a:buNone/>
-            </a:pPr>
-            <a:r>
-              <a:rPr lang="en-US" sz="2800" dirty="0"/>
-              <a:t> B43 Patel </a:t>
-            </a:r>
-            <a:r>
-              <a:rPr lang="en-US" sz="2800" dirty="0" err="1"/>
-              <a:t>Harshil</a:t>
-            </a:r>
-            <a:endParaRPr lang="en-US" sz="2800" dirty="0"/>
-          </a:p>
-          <a:p>
-            <a:pPr marL="1828800" lvl="4" indent="0">
-              <a:buNone/>
-            </a:pPr>
-            <a:r>
-              <a:rPr lang="en-US" sz="2800" dirty="0"/>
-              <a:t> B55 </a:t>
-            </a:r>
-            <a:r>
-              <a:rPr lang="en-US" sz="2800"/>
-              <a:t>Shahu </a:t>
-            </a:r>
-            <a:r>
-              <a:rPr lang="en-US" sz="2800" dirty="0" err="1"/>
-              <a:t>Dipakkumar</a:t>
-            </a:r>
-            <a:endParaRPr lang="en-US" sz="2800" dirty="0"/>
-          </a:p>
-          <a:p>
-            <a:r>
-              <a:rPr lang="en-US" sz="2800" dirty="0"/>
-              <a:t>Guide : Het </a:t>
-            </a:r>
-            <a:r>
-              <a:rPr lang="en-US" sz="2800" dirty="0" err="1"/>
-              <a:t>Rachh</a:t>
-            </a:r>
-            <a:endParaRPr lang="en-US" sz="2800" dirty="0"/>
-          </a:p>
-          <a:p>
-            <a:pPr marL="1828800" lvl="4" indent="0">
-              <a:buNone/>
-            </a:pPr>
-            <a:endParaRPr lang="en-US" sz="2800" dirty="0"/>
-          </a:p>
-        </p:txBody>
-      </p:sp>
-    </p:spTree>
-    <p:extLst>
-      <p:ext uri="{BB962C8B-B14F-4D97-AF65-F5344CB8AC3E}">
-        <p14:creationId xmlns:p14="http://schemas.microsoft.com/office/powerpoint/2010/main" val="101210297"/>
-      </p:ext>
-    </p:extLst>
-  </p:cSld>
-  <p:clrMapOvr>
-    <a:masterClrMapping/>
-  </p:clrMapOvr>
-</p:sld>
-</file>
-
-<file path=ppt/slides/slide20.xml><?xml version="1.0" encoding="utf-8"?>
+<file path=ppt/slides/slide18.xml><?xml version="1.0" encoding="utf-8"?>
 <p:sld xmlns:a="http://schemas.openxmlformats.org/drawingml/2006/main" xmlns:r="http://schemas.openxmlformats.org/officeDocument/2006/relationships" xmlns:p="http://schemas.openxmlformats.org/presentationml/2006/main">
   <p:cSld>
     <p:spTree>
@@ -16869,7 +16500,7 @@
 </p:sld>
 </file>
 
-<file path=ppt/slides/slide21.xml><?xml version="1.0" encoding="utf-8"?>
+<file path=ppt/slides/slide19.xml><?xml version="1.0" encoding="utf-8"?>
 <p:sld xmlns:a="http://schemas.openxmlformats.org/drawingml/2006/main" xmlns:r="http://schemas.openxmlformats.org/officeDocument/2006/relationships" xmlns:p="http://schemas.openxmlformats.org/presentationml/2006/main">
   <p:cSld>
     <p:spTree>
@@ -16932,6 +16563,159 @@
     <p:extLst>
       <p:ext uri="{BB962C8B-B14F-4D97-AF65-F5344CB8AC3E}">
         <p14:creationId xmlns:p14="http://schemas.microsoft.com/office/powerpoint/2010/main" val="4098473412"/>
+      </p:ext>
+    </p:extLst>
+  </p:cSld>
+  <p:clrMapOvr>
+    <a:masterClrMapping/>
+  </p:clrMapOvr>
+</p:sld>
+</file>
+
+<file path=ppt/slides/slide2.xml><?xml version="1.0" encoding="utf-8"?>
+<p:sld xmlns:a="http://schemas.openxmlformats.org/drawingml/2006/main" xmlns:r="http://schemas.openxmlformats.org/officeDocument/2006/relationships" xmlns:p="http://schemas.openxmlformats.org/presentationml/2006/main">
+  <p:cSld>
+    <p:spTree>
+      <p:nvGrpSpPr>
+        <p:cNvPr id="1" name=""/>
+        <p:cNvGrpSpPr/>
+        <p:nvPr/>
+      </p:nvGrpSpPr>
+      <p:grpSpPr>
+        <a:xfrm>
+          <a:off x="0" y="0"/>
+          <a:ext cx="0" cy="0"/>
+          <a:chOff x="0" y="0"/>
+          <a:chExt cx="0" cy="0"/>
+        </a:xfrm>
+      </p:grpSpPr>
+      <p:sp>
+        <p:nvSpPr>
+          <p:cNvPr id="2" name="Title 1">
+            <a:extLst>
+              <a:ext uri="{FF2B5EF4-FFF2-40B4-BE49-F238E27FC236}">
+                <a16:creationId xmlns:a16="http://schemas.microsoft.com/office/drawing/2014/main" id="{9E241995-4139-499E-BB99-A4BB82ECFB2E}"/>
+              </a:ext>
+            </a:extLst>
+          </p:cNvPr>
+          <p:cNvSpPr>
+            <a:spLocks noGrp="1"/>
+          </p:cNvSpPr>
+          <p:nvPr>
+            <p:ph type="title"/>
+          </p:nvPr>
+        </p:nvSpPr>
+        <p:spPr/>
+        <p:txBody>
+          <a:bodyPr/>
+          <a:lstStyle/>
+          <a:p>
+            <a:r>
+              <a:rPr lang="en-US" dirty="0"/>
+              <a:t>Group details</a:t>
+            </a:r>
+            <a:endParaRPr lang="en-IN" dirty="0"/>
+          </a:p>
+        </p:txBody>
+      </p:sp>
+      <p:sp>
+        <p:nvSpPr>
+          <p:cNvPr id="3" name="Content Placeholder 2">
+            <a:extLst>
+              <a:ext uri="{FF2B5EF4-FFF2-40B4-BE49-F238E27FC236}">
+                <a16:creationId xmlns:a16="http://schemas.microsoft.com/office/drawing/2014/main" id="{78C9DC47-A332-41A0-966D-9C02FF84D7BA}"/>
+              </a:ext>
+            </a:extLst>
+          </p:cNvPr>
+          <p:cNvSpPr>
+            <a:spLocks noGrp="1"/>
+          </p:cNvSpPr>
+          <p:nvPr>
+            <p:ph idx="1"/>
+          </p:nvPr>
+        </p:nvSpPr>
+        <p:spPr>
+          <a:xfrm>
+            <a:off x="685801" y="2142068"/>
+            <a:ext cx="10131425" cy="3539642"/>
+          </a:xfrm>
+        </p:spPr>
+        <p:txBody>
+          <a:bodyPr>
+            <a:normAutofit/>
+          </a:bodyPr>
+          <a:lstStyle/>
+          <a:p>
+            <a:r>
+              <a:rPr lang="en-US" sz="2800" dirty="0"/>
+              <a:t>Group No : 13</a:t>
+            </a:r>
+          </a:p>
+          <a:p>
+            <a:r>
+              <a:rPr lang="en-US" sz="2800" dirty="0"/>
+              <a:t>Members : B32 Mansuri Mohammed Sufyan</a:t>
+            </a:r>
+          </a:p>
+          <a:p>
+            <a:pPr marL="1828800" lvl="4" indent="0">
+              <a:buNone/>
+            </a:pPr>
+            <a:r>
+              <a:rPr lang="en-US" sz="2800" dirty="0"/>
+              <a:t> B43 Patel </a:t>
+            </a:r>
+            <a:r>
+              <a:rPr lang="en-US" sz="2800" dirty="0" err="1"/>
+              <a:t>Harshil</a:t>
+            </a:r>
+            <a:endParaRPr lang="en-US" sz="2800" dirty="0"/>
+          </a:p>
+          <a:p>
+            <a:pPr marL="1828800" lvl="4" indent="0">
+              <a:buNone/>
+            </a:pPr>
+            <a:r>
+              <a:rPr lang="en-US" sz="2800" dirty="0"/>
+              <a:t> B55 </a:t>
+            </a:r>
+            <a:r>
+              <a:rPr lang="en-US" sz="2800" dirty="0" err="1"/>
+              <a:t>Shahu</a:t>
+            </a:r>
+            <a:r>
+              <a:rPr lang="en-US" sz="2800" dirty="0"/>
+              <a:t> </a:t>
+            </a:r>
+            <a:r>
+              <a:rPr lang="en-US" sz="2800" dirty="0" err="1"/>
+              <a:t>Dipakkumar</a:t>
+            </a:r>
+            <a:endParaRPr lang="en-US" sz="2800" dirty="0"/>
+          </a:p>
+          <a:p>
+            <a:r>
+              <a:rPr lang="en-US" sz="2800" dirty="0"/>
+              <a:t>Internal Guide : Het </a:t>
+            </a:r>
+            <a:r>
+              <a:rPr lang="en-US" sz="2800" dirty="0" err="1"/>
+              <a:t>Rachh</a:t>
+            </a:r>
+            <a:endParaRPr lang="en-US" sz="2800" dirty="0"/>
+          </a:p>
+          <a:p>
+            <a:pPr marL="1828800" lvl="4" indent="0">
+              <a:buNone/>
+            </a:pPr>
+            <a:endParaRPr lang="en-US" sz="2800" dirty="0"/>
+          </a:p>
+        </p:txBody>
+      </p:sp>
+    </p:spTree>
+    <p:extLst>
+      <p:ext uri="{BB962C8B-B14F-4D97-AF65-F5344CB8AC3E}">
+        <p14:creationId xmlns:p14="http://schemas.microsoft.com/office/powerpoint/2010/main" val="101210297"/>
       </p:ext>
     </p:extLst>
   </p:cSld>
@@ -17013,8 +16797,12 @@
             <a:pPr algn="l"/>
             <a:r>
               <a:rPr lang="en-US" sz="2800" dirty="0"/>
-              <a:t>Car rental system allows individuals to book a self-drive rental car by the hour, day, week, or month. It seamlessly integrates into any platform as it is a web app. Our service enables users to rent self drive cars for traveling in the city or outstation.</a:t>
+              <a:t>Car rental system is a web based application that rent automobiles for short period of time for a fee from a few hours to a few days or  weeks.</a:t>
             </a:r>
+          </a:p>
+          <a:p>
+            <a:pPr algn="l"/>
+            <a:endParaRPr lang="en-US" sz="2800" dirty="0"/>
           </a:p>
           <a:p>
             <a:pPr marL="0" indent="0">
@@ -17229,6 +17017,16 @@
             </a:pPr>
             <a:r>
               <a:rPr lang="en-US" sz="2800" dirty="0"/>
+              <a:t>Flexible plans</a:t>
+            </a:r>
+          </a:p>
+          <a:p>
+            <a:pPr>
+              <a:buFont typeface="Arial" panose="020B0604020202020204" pitchFamily="34" charset="0"/>
+              <a:buChar char="•"/>
+            </a:pPr>
+            <a:r>
+              <a:rPr lang="en-US" sz="2800" dirty="0"/>
               <a:t>Testimonials</a:t>
             </a:r>
           </a:p>
@@ -17250,16 +17048,6 @@
             <a:r>
               <a:rPr lang="en-US" sz="2800" dirty="0"/>
               <a:t>User management</a:t>
-            </a:r>
-          </a:p>
-          <a:p>
-            <a:pPr>
-              <a:buFont typeface="Arial" panose="020B0604020202020204" pitchFamily="34" charset="0"/>
-              <a:buChar char="•"/>
-            </a:pPr>
-            <a:r>
-              <a:rPr lang="en-US" sz="2800" dirty="0"/>
-              <a:t>Fleet Management</a:t>
             </a:r>
           </a:p>
           <a:p>
@@ -17283,7 +17071,7 @@
             </a:pPr>
             <a:r>
               <a:rPr lang="en-US" sz="2800" dirty="0"/>
-              <a:t>Customer Support</a:t>
+              <a:t>User feedback</a:t>
             </a:r>
             <a:endParaRPr lang="en-IN" sz="2800" dirty="0"/>
           </a:p>
@@ -17373,42 +17161,37 @@
           <a:p>
             <a:r>
               <a:rPr lang="en-US" sz="2800" dirty="0"/>
-              <a:t>Customer</a:t>
+              <a:t>User module</a:t>
             </a:r>
           </a:p>
           <a:p>
-            <a:pPr lvl="1"/>
             <a:r>
-              <a:rPr lang="en-US" sz="2600" dirty="0"/>
-              <a:t>Login/Logout.</a:t>
+              <a:rPr lang="en-US" sz="2800" dirty="0"/>
+              <a:t>Admin module</a:t>
             </a:r>
           </a:p>
           <a:p>
-            <a:pPr lvl="1"/>
             <a:r>
-              <a:rPr lang="en-US" sz="2600" dirty="0"/>
-              <a:t>View fleet.</a:t>
+              <a:rPr lang="en-US" sz="2800" dirty="0"/>
+              <a:t>Car module</a:t>
             </a:r>
           </a:p>
           <a:p>
-            <a:pPr lvl="1"/>
             <a:r>
-              <a:rPr lang="en-US" sz="2600" dirty="0"/>
-              <a:t>View their transaction history.</a:t>
+              <a:rPr lang="en-US" sz="2800" dirty="0"/>
+              <a:t>Car booking module</a:t>
             </a:r>
           </a:p>
           <a:p>
-            <a:pPr lvl="1"/>
             <a:r>
-              <a:rPr lang="en-US" sz="2600" dirty="0"/>
-              <a:t>View &amp; manage their account details.</a:t>
+              <a:rPr lang="en-US" sz="2800" dirty="0"/>
+              <a:t>Car route module</a:t>
             </a:r>
           </a:p>
           <a:p>
-            <a:pPr lvl="1"/>
             <a:r>
-              <a:rPr lang="en-US" sz="2600" dirty="0"/>
-              <a:t>View &amp; give feedback</a:t>
+              <a:rPr lang="en-US" sz="2800" dirty="0"/>
+              <a:t>Payment module</a:t>
             </a:r>
           </a:p>
         </p:txBody>
@@ -17448,7 +17231,7 @@
           <p:cNvPr id="2" name="Title 1">
             <a:extLst>
               <a:ext uri="{FF2B5EF4-FFF2-40B4-BE49-F238E27FC236}">
-                <a16:creationId xmlns:a16="http://schemas.microsoft.com/office/drawing/2014/main" id="{42C9B6DA-4539-4472-8327-13684DBB4900}"/>
+                <a16:creationId xmlns:a16="http://schemas.microsoft.com/office/drawing/2014/main" id="{C577FE97-9783-44CB-AFDC-E7B5AFD516A7}"/>
               </a:ext>
             </a:extLst>
           </p:cNvPr>
@@ -17466,7 +17249,7 @@
           <a:p>
             <a:r>
               <a:rPr lang="en-US" dirty="0"/>
-              <a:t>Modules</a:t>
+              <a:t>Advantages</a:t>
             </a:r>
             <a:endParaRPr lang="en-IN" dirty="0"/>
           </a:p>
@@ -17477,7 +17260,7 @@
           <p:cNvPr id="3" name="Content Placeholder 2">
             <a:extLst>
               <a:ext uri="{FF2B5EF4-FFF2-40B4-BE49-F238E27FC236}">
-                <a16:creationId xmlns:a16="http://schemas.microsoft.com/office/drawing/2014/main" id="{45C1991F-0149-4642-B19F-6C4E1D43F59C}"/>
+                <a16:creationId xmlns:a16="http://schemas.microsoft.com/office/drawing/2014/main" id="{CC7E36B6-9171-4AA8-A0EF-A9CE27EE7CD7}"/>
               </a:ext>
             </a:extLst>
           </p:cNvPr>
@@ -17496,55 +17279,53 @@
           <a:lstStyle/>
           <a:p>
             <a:r>
-              <a:rPr lang="en-US" sz="2800" dirty="0"/>
-              <a:t>Admin</a:t>
+              <a:rPr lang="en-US" sz="2800" dirty="0">
+                <a:latin typeface="Calibri (Body)"/>
+              </a:rPr>
+              <a:t>Saves time and cost</a:t>
             </a:r>
           </a:p>
           <a:p>
-            <a:pPr lvl="1"/>
             <a:r>
-              <a:rPr lang="en-IN" sz="2600" dirty="0"/>
-              <a:t>Login/Logout.</a:t>
+              <a:rPr lang="en-US" sz="2800" dirty="0">
+                <a:latin typeface="Calibri (Body)"/>
+              </a:rPr>
+              <a:t>The car rental system present instant support to the clients.</a:t>
             </a:r>
           </a:p>
           <a:p>
-            <a:pPr lvl="1"/>
             <a:r>
-              <a:rPr lang="en-IN" sz="2600" dirty="0"/>
-              <a:t>Admin can view &amp; manage fleet.</a:t>
+              <a:rPr lang="en-US" sz="2800" dirty="0">
+                <a:latin typeface="Calibri (Body)"/>
+              </a:rPr>
+              <a:t>The car rental system gives an easy booking facility for the clients.</a:t>
             </a:r>
           </a:p>
           <a:p>
-            <a:pPr lvl="1"/>
             <a:r>
-              <a:rPr lang="en-IN" sz="2600" dirty="0"/>
-              <a:t>Manage bookings.</a:t>
+              <a:rPr lang="en-US" sz="2800" dirty="0">
+                <a:latin typeface="Calibri (Body)"/>
+              </a:rPr>
+              <a:t>The receipts can be easily generated from the rental system.</a:t>
             </a:r>
           </a:p>
           <a:p>
-            <a:pPr lvl="1"/>
             <a:r>
-              <a:rPr lang="en-IN" sz="2600" dirty="0"/>
-              <a:t>Manage users.</a:t>
+              <a:rPr lang="en-US" sz="2800" dirty="0">
+                <a:latin typeface="Calibri (Body)"/>
+              </a:rPr>
+              <a:t>The clients can make advance payment online and bookings for the cars.</a:t>
             </a:r>
           </a:p>
           <a:p>
-            <a:pPr lvl="1"/>
-            <a:r>
-              <a:rPr lang="en-IN" sz="2600" dirty="0"/>
-              <a:t>View &amp; manage feedback.</a:t>
-            </a:r>
-          </a:p>
-          <a:p>
-            <a:pPr lvl="1"/>
-            <a:endParaRPr lang="en-IN" sz="2600" dirty="0"/>
+            <a:endParaRPr lang="en-IN" sz="2800" dirty="0"/>
           </a:p>
         </p:txBody>
       </p:sp>
     </p:spTree>
     <p:extLst>
       <p:ext uri="{BB962C8B-B14F-4D97-AF65-F5344CB8AC3E}">
-        <p14:creationId xmlns:p14="http://schemas.microsoft.com/office/powerpoint/2010/main" val="402112902"/>
+        <p14:creationId xmlns:p14="http://schemas.microsoft.com/office/powerpoint/2010/main" val="2343534789"/>
       </p:ext>
     </p:extLst>
   </p:cSld>
@@ -17576,7 +17357,7 @@
           <p:cNvPr id="2" name="Title 1">
             <a:extLst>
               <a:ext uri="{FF2B5EF4-FFF2-40B4-BE49-F238E27FC236}">
-                <a16:creationId xmlns:a16="http://schemas.microsoft.com/office/drawing/2014/main" id="{42C9B6DA-4539-4472-8327-13684DBB4900}"/>
+                <a16:creationId xmlns:a16="http://schemas.microsoft.com/office/drawing/2014/main" id="{48F588C4-FDDD-4847-B4F9-159F95D3CBC9}"/>
               </a:ext>
             </a:extLst>
           </p:cNvPr>
@@ -17594,7 +17375,7 @@
           <a:p>
             <a:r>
               <a:rPr lang="en-US" dirty="0"/>
-              <a:t>Modules</a:t>
+              <a:t>Limitations</a:t>
             </a:r>
             <a:endParaRPr lang="en-IN" dirty="0"/>
           </a:p>
@@ -17605,7 +17386,7 @@
           <p:cNvPr id="3" name="Content Placeholder 2">
             <a:extLst>
               <a:ext uri="{FF2B5EF4-FFF2-40B4-BE49-F238E27FC236}">
-                <a16:creationId xmlns:a16="http://schemas.microsoft.com/office/drawing/2014/main" id="{45C1991F-0149-4642-B19F-6C4E1D43F59C}"/>
+                <a16:creationId xmlns:a16="http://schemas.microsoft.com/office/drawing/2014/main" id="{54C4843A-D34A-4FE0-8167-52E7081C2121}"/>
               </a:ext>
             </a:extLst>
           </p:cNvPr>
@@ -17625,40 +17406,28 @@
           <a:p>
             <a:r>
               <a:rPr lang="en-US" sz="2800" dirty="0"/>
-              <a:t>Visitor</a:t>
+              <a:t>Internet Connectivity</a:t>
             </a:r>
           </a:p>
           <a:p>
-            <a:pPr lvl="1"/>
             <a:r>
-              <a:rPr lang="en-IN" sz="2600" dirty="0"/>
-              <a:t>Register.</a:t>
+              <a:rPr lang="en-US" sz="2800" dirty="0"/>
+              <a:t>Limited Pickup &amp; Drop Points</a:t>
             </a:r>
           </a:p>
           <a:p>
-            <a:pPr lvl="1"/>
             <a:r>
-              <a:rPr lang="en-IN" sz="2600" dirty="0"/>
-              <a:t>View fleet.</a:t>
+              <a:rPr lang="en-US" sz="2800" dirty="0"/>
+              <a:t>GPS tracking</a:t>
             </a:r>
-          </a:p>
-          <a:p>
-            <a:pPr lvl="1"/>
-            <a:r>
-              <a:rPr lang="en-IN" sz="2600" dirty="0"/>
-              <a:t>View Testimonials.</a:t>
-            </a:r>
-          </a:p>
-          <a:p>
-            <a:pPr lvl="1"/>
-            <a:endParaRPr lang="en-IN" sz="2600" dirty="0"/>
+            <a:endParaRPr lang="en-IN" sz="2800" dirty="0"/>
           </a:p>
         </p:txBody>
       </p:sp>
     </p:spTree>
     <p:extLst>
       <p:ext uri="{BB962C8B-B14F-4D97-AF65-F5344CB8AC3E}">
-        <p14:creationId xmlns:p14="http://schemas.microsoft.com/office/powerpoint/2010/main" val="2932262016"/>
+        <p14:creationId xmlns:p14="http://schemas.microsoft.com/office/powerpoint/2010/main" val="572627484"/>
       </p:ext>
     </p:extLst>
   </p:cSld>
@@ -17687,10 +17456,10 @@
       </p:grpSpPr>
       <p:sp>
         <p:nvSpPr>
-          <p:cNvPr id="2" name="Title 1">
+          <p:cNvPr id="4" name="Title 3">
             <a:extLst>
               <a:ext uri="{FF2B5EF4-FFF2-40B4-BE49-F238E27FC236}">
-                <a16:creationId xmlns:a16="http://schemas.microsoft.com/office/drawing/2014/main" id="{C577FE97-9783-44CB-AFDC-E7B5AFD516A7}"/>
+                <a16:creationId xmlns:a16="http://schemas.microsoft.com/office/drawing/2014/main" id="{4B160A0A-020C-4EFF-B2E6-B2A7C4560B99}"/>
               </a:ext>
             </a:extLst>
           </p:cNvPr>
@@ -17701,90 +17470,58 @@
             <p:ph type="title"/>
           </p:nvPr>
         </p:nvSpPr>
-        <p:spPr/>
+        <p:spPr>
+          <a:xfrm>
+            <a:off x="0" y="0"/>
+            <a:ext cx="10131425" cy="661137"/>
+          </a:xfrm>
+        </p:spPr>
         <p:txBody>
           <a:bodyPr/>
           <a:lstStyle/>
           <a:p>
             <a:r>
               <a:rPr lang="en-US" dirty="0"/>
-              <a:t>Advantages</a:t>
+              <a:t>ER DIAGRAM</a:t>
             </a:r>
             <a:endParaRPr lang="en-IN" dirty="0"/>
           </a:p>
         </p:txBody>
       </p:sp>
-      <p:sp>
-        <p:nvSpPr>
-          <p:cNvPr id="3" name="Content Placeholder 2">
+      <p:pic>
+        <p:nvPicPr>
+          <p:cNvPr id="3" name="Picture 2">
             <a:extLst>
               <a:ext uri="{FF2B5EF4-FFF2-40B4-BE49-F238E27FC236}">
-                <a16:creationId xmlns:a16="http://schemas.microsoft.com/office/drawing/2014/main" id="{CC7E36B6-9171-4AA8-A0EF-A9CE27EE7CD7}"/>
+                <a16:creationId xmlns:a16="http://schemas.microsoft.com/office/drawing/2014/main" id="{17D2B219-A778-43F7-AE2B-3C042525A91C}"/>
               </a:ext>
             </a:extLst>
           </p:cNvPr>
-          <p:cNvSpPr>
-            <a:spLocks noGrp="1"/>
-          </p:cNvSpPr>
-          <p:nvPr>
-            <p:ph idx="1"/>
-          </p:nvPr>
-        </p:nvSpPr>
-        <p:spPr/>
-        <p:txBody>
-          <a:bodyPr>
-            <a:normAutofit/>
-          </a:bodyPr>
-          <a:lstStyle/>
-          <a:p>
-            <a:r>
-              <a:rPr lang="en-US" sz="2800" dirty="0">
-                <a:latin typeface="Calibri (Body)"/>
-              </a:rPr>
-              <a:t>Saves time and cost</a:t>
-            </a:r>
-          </a:p>
-          <a:p>
-            <a:r>
-              <a:rPr lang="en-US" sz="2800" dirty="0">
-                <a:latin typeface="Calibri (Body)"/>
-              </a:rPr>
-              <a:t>The car rental system present instant support to the clients.</a:t>
-            </a:r>
-          </a:p>
-          <a:p>
-            <a:r>
-              <a:rPr lang="en-US" sz="2800" dirty="0">
-                <a:latin typeface="Calibri (Body)"/>
-              </a:rPr>
-              <a:t>The car rental system gives an easy booking facility for the clients.</a:t>
-            </a:r>
-          </a:p>
-          <a:p>
-            <a:r>
-              <a:rPr lang="en-US" sz="2800" dirty="0">
-                <a:latin typeface="Calibri (Body)"/>
-              </a:rPr>
-              <a:t>The receipts can be easily generated from the rental system.</a:t>
-            </a:r>
-          </a:p>
-          <a:p>
-            <a:r>
-              <a:rPr lang="en-US" sz="2800" dirty="0">
-                <a:latin typeface="Calibri (Body)"/>
-              </a:rPr>
-              <a:t>The clients can make advance payment online and bookings for the cars.</a:t>
-            </a:r>
-          </a:p>
-          <a:p>
-            <a:endParaRPr lang="en-IN" sz="2800" dirty="0"/>
-          </a:p>
-        </p:txBody>
-      </p:sp>
+          <p:cNvPicPr>
+            <a:picLocks noChangeAspect="1"/>
+          </p:cNvPicPr>
+          <p:nvPr/>
+        </p:nvPicPr>
+        <p:blipFill>
+          <a:blip r:embed="rId2"/>
+          <a:stretch>
+            <a:fillRect/>
+          </a:stretch>
+        </p:blipFill>
+        <p:spPr>
+          <a:xfrm>
+            <a:off x="650240" y="559293"/>
+            <a:ext cx="10952480" cy="6176788"/>
+          </a:xfrm>
+          <a:prstGeom prst="rect">
+            <a:avLst/>
+          </a:prstGeom>
+        </p:spPr>
+      </p:pic>
     </p:spTree>
     <p:extLst>
       <p:ext uri="{BB962C8B-B14F-4D97-AF65-F5344CB8AC3E}">
-        <p14:creationId xmlns:p14="http://schemas.microsoft.com/office/powerpoint/2010/main" val="2343534789"/>
+        <p14:creationId xmlns:p14="http://schemas.microsoft.com/office/powerpoint/2010/main" val="2564050425"/>
       </p:ext>
     </p:extLst>
   </p:cSld>

</xml_diff>